<commit_message>
Minor fix for focus manual
</commit_message>
<xml_diff>
--- a/misc/FOCUS/FOCUS.pptx
+++ b/misc/FOCUS/FOCUS.pptx
@@ -304,7 +304,7 @@
           <a:p>
             <a:fld id="{66F2DB81-FDD4-6C4C-99FD-378D10BF8DE1}" type="datetimeFigureOut">
               <a:rPr kumimoji="1" lang="ja-JP" altLang="en-US" smtClean="0"/>
-              <a:t>16/01/07</a:t>
+              <a:t>16/01/08</a:t>
             </a:fld>
             <a:endParaRPr kumimoji="1" lang="ja-JP" altLang="en-US"/>
           </a:p>
@@ -501,7 +501,7 @@
           <a:p>
             <a:fld id="{66F2DB81-FDD4-6C4C-99FD-378D10BF8DE1}" type="datetimeFigureOut">
               <a:rPr kumimoji="1" lang="ja-JP" altLang="en-US" smtClean="0"/>
-              <a:t>16/01/07</a:t>
+              <a:t>16/01/08</a:t>
             </a:fld>
             <a:endParaRPr kumimoji="1" lang="ja-JP" altLang="en-US"/>
           </a:p>
@@ -708,7 +708,7 @@
           <a:p>
             <a:fld id="{66F2DB81-FDD4-6C4C-99FD-378D10BF8DE1}" type="datetimeFigureOut">
               <a:rPr kumimoji="1" lang="ja-JP" altLang="en-US" smtClean="0"/>
-              <a:t>16/01/07</a:t>
+              <a:t>16/01/08</a:t>
             </a:fld>
             <a:endParaRPr kumimoji="1" lang="ja-JP" altLang="en-US"/>
           </a:p>
@@ -905,7 +905,7 @@
           <a:p>
             <a:fld id="{66F2DB81-FDD4-6C4C-99FD-378D10BF8DE1}" type="datetimeFigureOut">
               <a:rPr kumimoji="1" lang="ja-JP" altLang="en-US" smtClean="0"/>
-              <a:t>16/01/07</a:t>
+              <a:t>16/01/08</a:t>
             </a:fld>
             <a:endParaRPr kumimoji="1" lang="ja-JP" altLang="en-US"/>
           </a:p>
@@ -1146,7 +1146,7 @@
           <a:p>
             <a:fld id="{66F2DB81-FDD4-6C4C-99FD-378D10BF8DE1}" type="datetimeFigureOut">
               <a:rPr kumimoji="1" lang="ja-JP" altLang="en-US" smtClean="0"/>
-              <a:t>16/01/07</a:t>
+              <a:t>16/01/08</a:t>
             </a:fld>
             <a:endParaRPr kumimoji="1" lang="ja-JP" altLang="en-US"/>
           </a:p>
@@ -1493,7 +1493,7 @@
           <a:p>
             <a:fld id="{66F2DB81-FDD4-6C4C-99FD-378D10BF8DE1}" type="datetimeFigureOut">
               <a:rPr kumimoji="1" lang="ja-JP" altLang="en-US" smtClean="0"/>
-              <a:t>16/01/07</a:t>
+              <a:t>16/01/08</a:t>
             </a:fld>
             <a:endParaRPr kumimoji="1" lang="ja-JP" altLang="en-US"/>
           </a:p>
@@ -1986,7 +1986,7 @@
           <a:p>
             <a:fld id="{66F2DB81-FDD4-6C4C-99FD-378D10BF8DE1}" type="datetimeFigureOut">
               <a:rPr kumimoji="1" lang="ja-JP" altLang="en-US" smtClean="0"/>
-              <a:t>16/01/07</a:t>
+              <a:t>16/01/08</a:t>
             </a:fld>
             <a:endParaRPr kumimoji="1" lang="ja-JP" altLang="en-US"/>
           </a:p>
@@ -2099,7 +2099,7 @@
           <a:p>
             <a:fld id="{66F2DB81-FDD4-6C4C-99FD-378D10BF8DE1}" type="datetimeFigureOut">
               <a:rPr kumimoji="1" lang="ja-JP" altLang="en-US" smtClean="0"/>
-              <a:t>16/01/07</a:t>
+              <a:t>16/01/08</a:t>
             </a:fld>
             <a:endParaRPr kumimoji="1" lang="ja-JP" altLang="en-US"/>
           </a:p>
@@ -2189,7 +2189,7 @@
           <a:p>
             <a:fld id="{66F2DB81-FDD4-6C4C-99FD-378D10BF8DE1}" type="datetimeFigureOut">
               <a:rPr kumimoji="1" lang="ja-JP" altLang="en-US" smtClean="0"/>
-              <a:t>16/01/07</a:t>
+              <a:t>16/01/08</a:t>
             </a:fld>
             <a:endParaRPr kumimoji="1" lang="ja-JP" altLang="en-US"/>
           </a:p>
@@ -2378,7 +2378,7 @@
           <a:p>
             <a:fld id="{66F2DB81-FDD4-6C4C-99FD-378D10BF8DE1}" type="datetimeFigureOut">
               <a:rPr kumimoji="1" lang="ja-JP" altLang="en-US" smtClean="0"/>
-              <a:t>16/01/07</a:t>
+              <a:t>16/01/08</a:t>
             </a:fld>
             <a:endParaRPr kumimoji="1" lang="ja-JP" altLang="en-US"/>
           </a:p>
@@ -2728,7 +2728,7 @@
           <a:p>
             <a:fld id="{66F2DB81-FDD4-6C4C-99FD-378D10BF8DE1}" type="datetimeFigureOut">
               <a:rPr kumimoji="1" lang="ja-JP" altLang="en-US" smtClean="0"/>
-              <a:t>16/01/07</a:t>
+              <a:t>16/01/08</a:t>
             </a:fld>
             <a:endParaRPr kumimoji="1" lang="ja-JP" altLang="en-US"/>
           </a:p>
@@ -3139,7 +3139,7 @@
           <a:p>
             <a:fld id="{66F2DB81-FDD4-6C4C-99FD-378D10BF8DE1}" type="datetimeFigureOut">
               <a:rPr kumimoji="1" lang="ja-JP" altLang="en-US" smtClean="0"/>
-              <a:t>16/01/07</a:t>
+              <a:t>16/01/08</a:t>
             </a:fld>
             <a:endParaRPr kumimoji="1" lang="ja-JP" altLang="en-US"/>
           </a:p>
@@ -3713,22 +3713,14 @@
           <a:lstStyle/>
           <a:p>
             <a:r>
-              <a:rPr lang="en-US" altLang="ja-JP" dirty="0" smtClean="0"/>
+              <a:rPr lang="en-US" altLang="ja-JP" sz="4000" dirty="0" smtClean="0"/>
               <a:t>FOCUS</a:t>
             </a:r>
             <a:r>
-              <a:rPr lang="ja-JP" altLang="en-US" dirty="0" smtClean="0"/>
-              <a:t>スパコン（</a:t>
-            </a:r>
-            <a:r>
-              <a:rPr lang="en-US" altLang="ja-JP" dirty="0" smtClean="0"/>
-              <a:t>1/2</a:t>
-            </a:r>
-            <a:r>
-              <a:rPr lang="ja-JP" altLang="en-US" dirty="0" smtClean="0"/>
-              <a:t>）</a:t>
-            </a:r>
-            <a:endParaRPr kumimoji="1" lang="ja-JP" altLang="en-US" dirty="0"/>
+              <a:rPr lang="ja-JP" altLang="en-US" sz="4000" dirty="0"/>
+              <a:t>スパコンへのログイン方法</a:t>
+            </a:r>
+            <a:endParaRPr lang="en-US" altLang="ja-JP" sz="4000" dirty="0"/>
           </a:p>
         </p:txBody>
       </p:sp>
@@ -3756,137 +3748,108 @@
           <a:p>
             <a:pPr algn="just"/>
             <a:r>
-              <a:rPr lang="ja-JP" altLang="en-US" sz="2400" dirty="0" smtClean="0"/>
-              <a:t>端末から</a:t>
+              <a:rPr lang="en-US" altLang="ja-JP" sz="2600" dirty="0" err="1" smtClean="0"/>
+              <a:t>PuTTY</a:t>
+            </a:r>
+            <a:r>
+              <a:rPr lang="ja-JP" altLang="en-US" sz="2600" dirty="0" smtClean="0"/>
+              <a:t>もしくは</a:t>
+            </a:r>
+            <a:r>
+              <a:rPr lang="en-US" altLang="ja-JP" sz="2600" dirty="0" err="1" smtClean="0"/>
+              <a:t>TeraTerm</a:t>
+            </a:r>
+            <a:r>
+              <a:rPr lang="ja-JP" altLang="en-US" sz="2600" dirty="0" smtClean="0"/>
+              <a:t>などの</a:t>
+            </a:r>
+            <a:r>
+              <a:rPr lang="en-US" altLang="ja-JP" sz="2600" dirty="0" err="1" smtClean="0"/>
+              <a:t>ssh</a:t>
+            </a:r>
+            <a:r>
+              <a:rPr lang="en-US" altLang="ja-JP" sz="2600" dirty="0" smtClean="0"/>
+              <a:t> client</a:t>
+            </a:r>
+            <a:r>
+              <a:rPr lang="ja-JP" altLang="en-US" sz="2600" dirty="0" smtClean="0"/>
+              <a:t>を起動</a:t>
+            </a:r>
+            <a:endParaRPr lang="en-US" altLang="ja-JP" sz="2600" dirty="0" smtClean="0"/>
+          </a:p>
+          <a:p>
+            <a:pPr algn="just"/>
+            <a:r>
+              <a:rPr lang="en-US" altLang="ja-JP" sz="2600" dirty="0"/>
+              <a:t>ff01.j-</a:t>
+            </a:r>
+            <a:r>
+              <a:rPr lang="en-US" altLang="ja-JP" sz="2600" dirty="0" smtClean="0"/>
+              <a:t>focus.jp</a:t>
+            </a:r>
+            <a:r>
+              <a:rPr lang="ja-JP" altLang="en-US" sz="2600" dirty="0" smtClean="0"/>
+              <a:t>にログインする</a:t>
+            </a:r>
+            <a:endParaRPr lang="en-US" altLang="ja-JP" sz="2600" dirty="0" smtClean="0"/>
+          </a:p>
+          <a:p>
+            <a:r>
+              <a:rPr lang="ja-JP" altLang="en-US" sz="2600" dirty="0" smtClean="0"/>
+              <a:t>下記のコマンドにより、環境設定を行う</a:t>
+            </a:r>
+            <a:endParaRPr lang="en-US" altLang="ja-JP" sz="2600" dirty="0" smtClean="0"/>
+          </a:p>
+          <a:p>
+            <a:pPr lvl="1"/>
+            <a:r>
+              <a:rPr lang="en-US" altLang="ja-JP" sz="2400" dirty="0"/>
+              <a:t>$ export PATH=/home1/</a:t>
+            </a:r>
+            <a:r>
+              <a:rPr lang="en-US" altLang="ja-JP" sz="2400" dirty="0" err="1"/>
+              <a:t>gleo</a:t>
+            </a:r>
+            <a:r>
+              <a:rPr lang="en-US" altLang="ja-JP" sz="2400" dirty="0"/>
+              <a:t>/</a:t>
             </a:r>
             <a:r>
               <a:rPr lang="en-US" altLang="ja-JP" sz="2400" dirty="0" smtClean="0"/>
-              <a:t>FOCUS</a:t>
-            </a:r>
-            <a:r>
-              <a:rPr lang="ja-JP" altLang="en-US" sz="2400" dirty="0" smtClean="0"/>
-              <a:t>スパコンへのログイン方法</a:t>
+              <a:t>share</a:t>
+            </a:r>
+            <a:r>
+              <a:rPr lang="en-US" altLang="ja-JP" sz="2400" dirty="0"/>
+              <a:t>/</a:t>
+            </a:r>
+            <a:r>
+              <a:rPr lang="en-US" altLang="ja-JP" sz="2400" dirty="0" err="1"/>
+              <a:t>xmp</a:t>
+            </a:r>
+            <a:r>
+              <a:rPr lang="en-US" altLang="ja-JP" sz="2400" dirty="0"/>
+              <a:t>/bin:$</a:t>
+            </a:r>
+            <a:r>
+              <a:rPr lang="en-US" altLang="ja-JP" sz="2400" dirty="0" smtClean="0"/>
+              <a:t>PATH</a:t>
+            </a:r>
+          </a:p>
+          <a:p>
+            <a:pPr lvl="1"/>
+            <a:r>
+              <a:rPr lang="en-US" altLang="ja-JP" sz="2400" dirty="0"/>
+              <a:t>$ module load PrgEnv-</a:t>
+            </a:r>
+            <a:r>
+              <a:rPr lang="en-US" altLang="ja-JP" sz="2400" dirty="0" smtClean="0"/>
+              <a:t>gnu482 gnu</a:t>
+            </a:r>
+            <a:r>
+              <a:rPr lang="en-US" altLang="ja-JP" sz="2400" dirty="0"/>
+              <a:t>/openmpi165</a:t>
             </a:r>
             <a:endParaRPr lang="en-US" altLang="ja-JP" sz="2400" dirty="0" smtClean="0"/>
-          </a:p>
-          <a:p>
-            <a:pPr lvl="1" algn="just"/>
-            <a:r>
-              <a:rPr lang="en-US" altLang="ja-JP" sz="2400" dirty="0" err="1" smtClean="0"/>
-              <a:t>PuTTY</a:t>
-            </a:r>
-            <a:r>
-              <a:rPr lang="ja-JP" altLang="en-US" sz="2400" dirty="0" smtClean="0"/>
-              <a:t>もしくは</a:t>
-            </a:r>
-            <a:r>
-              <a:rPr lang="en-US" altLang="ja-JP" sz="2400" dirty="0" err="1" smtClean="0"/>
-              <a:t>TeraTerm</a:t>
-            </a:r>
-            <a:r>
-              <a:rPr lang="ja-JP" altLang="en-US" sz="2400" dirty="0" smtClean="0"/>
-              <a:t>などの</a:t>
-            </a:r>
-            <a:r>
-              <a:rPr lang="en-US" altLang="ja-JP" sz="2400" dirty="0" err="1" smtClean="0"/>
-              <a:t>ssh</a:t>
-            </a:r>
-            <a:r>
-              <a:rPr lang="en-US" altLang="ja-JP" sz="2400" dirty="0" smtClean="0"/>
-              <a:t> client</a:t>
-            </a:r>
-            <a:r>
-              <a:rPr lang="ja-JP" altLang="en-US" sz="2400" dirty="0" smtClean="0"/>
-              <a:t>を起動</a:t>
-            </a:r>
-            <a:endParaRPr lang="en-US" altLang="ja-JP" sz="2400" dirty="0" smtClean="0"/>
-          </a:p>
-          <a:p>
-            <a:pPr lvl="1" algn="just"/>
-            <a:r>
-              <a:rPr lang="en-US" altLang="ja-JP" sz="2400" dirty="0"/>
-              <a:t>ff01.j-</a:t>
-            </a:r>
-            <a:r>
-              <a:rPr lang="en-US" altLang="ja-JP" sz="2400" dirty="0" smtClean="0"/>
-              <a:t>focus.jp</a:t>
-            </a:r>
-            <a:r>
-              <a:rPr lang="ja-JP" altLang="en-US" sz="2400" dirty="0" smtClean="0"/>
-              <a:t>にログインする</a:t>
-            </a:r>
-            <a:endParaRPr lang="en-US" altLang="ja-JP" sz="2400" dirty="0" smtClean="0"/>
-          </a:p>
-          <a:p>
-            <a:pPr lvl="1"/>
-            <a:r>
-              <a:rPr lang="ja-JP" altLang="en-US" sz="2400" dirty="0" smtClean="0"/>
-              <a:t>下記のコマンドにより</a:t>
-            </a:r>
-            <a:r>
-              <a:rPr lang="ja-JP" altLang="en-US" sz="2400" dirty="0" smtClean="0"/>
-              <a:t>、</a:t>
-            </a:r>
-            <a:r>
-              <a:rPr lang="ja-JP" altLang="en-US" sz="2400" dirty="0" smtClean="0"/>
-              <a:t>環境</a:t>
-            </a:r>
-            <a:r>
-              <a:rPr lang="ja-JP" altLang="en-US" sz="2400" dirty="0" smtClean="0"/>
-              <a:t>設定を行う</a:t>
-            </a:r>
-            <a:endParaRPr lang="en-US" altLang="ja-JP" sz="2400" dirty="0" smtClean="0"/>
-          </a:p>
-          <a:p>
-            <a:pPr lvl="2"/>
-            <a:r>
-              <a:rPr lang="en-US" altLang="ja-JP" sz="2200" dirty="0"/>
-              <a:t>$ export PATH=/home1/</a:t>
-            </a:r>
-            <a:r>
-              <a:rPr lang="en-US" altLang="ja-JP" sz="2200" dirty="0" err="1"/>
-              <a:t>gleo</a:t>
-            </a:r>
-            <a:r>
-              <a:rPr lang="en-US" altLang="ja-JP" sz="2200" dirty="0"/>
-              <a:t>/</a:t>
-            </a:r>
-            <a:r>
-              <a:rPr lang="en-US" altLang="ja-JP" sz="2200" dirty="0" smtClean="0"/>
-              <a:t>share</a:t>
-            </a:r>
-            <a:r>
-              <a:rPr lang="en-US" altLang="ja-JP" sz="2200" dirty="0"/>
-              <a:t>/</a:t>
-            </a:r>
-            <a:r>
-              <a:rPr lang="en-US" altLang="ja-JP" sz="2200" dirty="0" err="1"/>
-              <a:t>xmp</a:t>
-            </a:r>
-            <a:r>
-              <a:rPr lang="en-US" altLang="ja-JP" sz="2200" dirty="0"/>
-              <a:t>/bin:$</a:t>
-            </a:r>
-            <a:r>
-              <a:rPr lang="en-US" altLang="ja-JP" sz="2200" dirty="0" smtClean="0"/>
-              <a:t>PATH</a:t>
-            </a:r>
-          </a:p>
-          <a:p>
-            <a:pPr lvl="2"/>
-            <a:r>
-              <a:rPr lang="en-US" altLang="ja-JP" sz="2200" dirty="0"/>
-              <a:t>$ module load PrgEnv-</a:t>
-            </a:r>
-            <a:r>
-              <a:rPr lang="en-US" altLang="ja-JP" sz="2200" dirty="0" smtClean="0"/>
-              <a:t>gnu482 gnu</a:t>
-            </a:r>
-            <a:r>
-              <a:rPr lang="en-US" altLang="ja-JP" sz="2200" dirty="0"/>
-              <a:t>/openmpi165</a:t>
-            </a:r>
-            <a:endParaRPr lang="en-US" altLang="ja-JP" sz="2200" dirty="0" smtClean="0"/>
           </a:p>
           <a:p>
             <a:pPr lvl="1"/>
@@ -3987,24 +3950,8 @@
           <a:lstStyle/>
           <a:p>
             <a:r>
-              <a:rPr lang="en-US" altLang="ja-JP" dirty="0" smtClean="0"/>
-              <a:t>FOCUS</a:t>
-            </a:r>
-            <a:r>
-              <a:rPr lang="ja-JP" altLang="en-US" dirty="0" smtClean="0"/>
-              <a:t>スパコン（</a:t>
-            </a:r>
-            <a:r>
-              <a:rPr lang="en-US" altLang="ja-JP" dirty="0"/>
-              <a:t>2</a:t>
-            </a:r>
-            <a:r>
-              <a:rPr lang="en-US" altLang="ja-JP" dirty="0" smtClean="0"/>
-              <a:t>/2</a:t>
-            </a:r>
-            <a:r>
-              <a:rPr lang="ja-JP" altLang="en-US" dirty="0" smtClean="0"/>
-              <a:t>）</a:t>
+              <a:rPr kumimoji="1" lang="ja-JP" altLang="en-US" dirty="0" smtClean="0"/>
+              <a:t>プログラムの実行方法</a:t>
             </a:r>
             <a:endParaRPr kumimoji="1" lang="ja-JP" altLang="en-US" dirty="0"/>
           </a:p>
@@ -4034,136 +3981,128 @@
           <a:p>
             <a:pPr algn="just"/>
             <a:r>
-              <a:rPr lang="ja-JP" altLang="en-US" sz="2400" dirty="0" smtClean="0"/>
-              <a:t>プログラムの実行方法</a:t>
-            </a:r>
-            <a:endParaRPr lang="en-US" altLang="ja-JP" sz="2400" dirty="0" smtClean="0"/>
-          </a:p>
-          <a:p>
-            <a:pPr lvl="1" algn="just"/>
-            <a:r>
-              <a:rPr lang="en-US" altLang="ja-JP" sz="2400" dirty="0" smtClean="0"/>
+              <a:rPr lang="en-US" altLang="ja-JP" sz="2600" dirty="0" smtClean="0"/>
               <a:t>$ </a:t>
             </a:r>
             <a:r>
-              <a:rPr lang="en-US" altLang="ja-JP" sz="2400" dirty="0" err="1" smtClean="0"/>
+              <a:rPr lang="en-US" altLang="ja-JP" sz="2600" dirty="0" err="1" smtClean="0"/>
               <a:t>fjsub</a:t>
             </a:r>
             <a:r>
-              <a:rPr lang="en-US" altLang="ja-JP" sz="2400" dirty="0" smtClean="0"/>
+              <a:rPr lang="en-US" altLang="ja-JP" sz="2600" dirty="0" smtClean="0"/>
               <a:t> </a:t>
             </a:r>
             <a:r>
-              <a:rPr lang="ja-JP" altLang="en-US" sz="2400" dirty="0" smtClean="0">
+              <a:rPr lang="ja-JP" altLang="en-US" sz="2600" dirty="0" smtClean="0">
                 <a:latin typeface="+mj-ea"/>
                 <a:ea typeface="+mj-ea"/>
               </a:rPr>
               <a:t>（スクリプトファイル）</a:t>
             </a:r>
-            <a:endParaRPr lang="en-US" altLang="ja-JP" sz="2400" dirty="0" smtClean="0">
+            <a:endParaRPr lang="en-US" altLang="ja-JP" sz="2600" dirty="0" smtClean="0">
               <a:latin typeface="+mj-ea"/>
               <a:ea typeface="+mj-ea"/>
             </a:endParaRPr>
           </a:p>
           <a:p>
+            <a:pPr algn="just"/>
+            <a:r>
+              <a:rPr lang="ja-JP" altLang="en-US" sz="2600" dirty="0" smtClean="0"/>
+              <a:t>用意したスクリプトファイルは下記の通り</a:t>
+            </a:r>
+            <a:endParaRPr lang="en-US" altLang="ja-JP" sz="2600" dirty="0" smtClean="0"/>
+          </a:p>
+          <a:p>
             <a:pPr lvl="1" algn="just"/>
             <a:r>
-              <a:rPr lang="ja-JP" altLang="en-US" sz="2400" dirty="0" smtClean="0"/>
-              <a:t>用意したスクリプトファイルは下記の通り</a:t>
-            </a:r>
-            <a:endParaRPr lang="en-US" altLang="ja-JP" sz="2400" dirty="0" smtClean="0"/>
-          </a:p>
-          <a:p>
-            <a:pPr lvl="2" algn="just"/>
-            <a:r>
-              <a:rPr lang="en-US" altLang="ja-JP" sz="2400" dirty="0" smtClean="0"/>
+              <a:rPr lang="en-US" altLang="ja-JP" sz="2600" dirty="0" smtClean="0"/>
               <a:t>~/lecture/run-1.sh</a:t>
             </a:r>
             <a:r>
-              <a:rPr lang="ja-JP" altLang="en-US" sz="2400" dirty="0" smtClean="0"/>
+              <a:rPr lang="ja-JP" altLang="en-US" sz="2600" dirty="0" smtClean="0"/>
               <a:t>・・・</a:t>
             </a:r>
             <a:r>
-              <a:rPr lang="en-US" altLang="ja-JP" sz="2400" dirty="0" smtClean="0"/>
+              <a:rPr lang="en-US" altLang="ja-JP" sz="2600" dirty="0" smtClean="0"/>
               <a:t>1</a:t>
             </a:r>
             <a:r>
-              <a:rPr lang="ja-JP" altLang="en-US" sz="2400" dirty="0" smtClean="0"/>
+              <a:rPr lang="ja-JP" altLang="en-US" sz="2600" dirty="0" smtClean="0"/>
               <a:t>プロセス用</a:t>
             </a:r>
-            <a:endParaRPr lang="en-US" altLang="ja-JP" sz="2400" dirty="0" smtClean="0"/>
-          </a:p>
-          <a:p>
-            <a:pPr lvl="2" algn="just"/>
-            <a:r>
-              <a:rPr lang="en-US" altLang="ja-JP" sz="2400" dirty="0" smtClean="0"/>
+            <a:endParaRPr lang="en-US" altLang="ja-JP" sz="2600" dirty="0" smtClean="0"/>
+          </a:p>
+          <a:p>
+            <a:pPr lvl="1" algn="just"/>
+            <a:r>
+              <a:rPr lang="en-US" altLang="ja-JP" sz="2600" dirty="0" smtClean="0"/>
               <a:t>~</a:t>
             </a:r>
             <a:r>
-              <a:rPr lang="en-US" altLang="ja-JP" sz="2400" dirty="0"/>
+              <a:rPr lang="en-US" altLang="ja-JP" sz="2600" dirty="0"/>
               <a:t>/lecture/run</a:t>
             </a:r>
             <a:r>
-              <a:rPr lang="en-US" altLang="ja-JP" sz="2400" dirty="0" smtClean="0"/>
+              <a:rPr lang="en-US" altLang="ja-JP" sz="2600" dirty="0" smtClean="0"/>
               <a:t>-2.</a:t>
             </a:r>
             <a:r>
-              <a:rPr lang="en-US" altLang="ja-JP" sz="2400" dirty="0"/>
+              <a:rPr lang="en-US" altLang="ja-JP" sz="2600" dirty="0"/>
               <a:t>sh</a:t>
             </a:r>
             <a:r>
-              <a:rPr lang="ja-JP" altLang="en-US" sz="2400" dirty="0"/>
+              <a:rPr lang="ja-JP" altLang="en-US" sz="2600" dirty="0"/>
               <a:t>・・</a:t>
             </a:r>
             <a:r>
-              <a:rPr lang="ja-JP" altLang="en-US" sz="2400" dirty="0" smtClean="0"/>
+              <a:rPr lang="ja-JP" altLang="en-US" sz="2600" dirty="0" smtClean="0"/>
               <a:t>・</a:t>
             </a:r>
             <a:r>
-              <a:rPr lang="en-US" altLang="ja-JP" sz="2400" dirty="0" smtClean="0"/>
+              <a:rPr lang="en-US" altLang="ja-JP" sz="2600" dirty="0" smtClean="0"/>
               <a:t>2</a:t>
             </a:r>
             <a:r>
-              <a:rPr lang="ja-JP" altLang="en-US" sz="2400" dirty="0" smtClean="0"/>
+              <a:rPr lang="ja-JP" altLang="en-US" sz="2600" dirty="0" smtClean="0"/>
               <a:t>プロセス用</a:t>
             </a:r>
-            <a:endParaRPr lang="en-US" altLang="ja-JP" sz="2400" dirty="0" smtClean="0"/>
-          </a:p>
-          <a:p>
-            <a:pPr lvl="2" algn="just"/>
-            <a:r>
-              <a:rPr lang="en-US" altLang="ja-JP" sz="2400" dirty="0" smtClean="0"/>
+            <a:endParaRPr lang="en-US" altLang="ja-JP" sz="2600" dirty="0" smtClean="0"/>
+          </a:p>
+          <a:p>
+            <a:pPr lvl="1" algn="just"/>
+            <a:r>
+              <a:rPr lang="en-US" altLang="ja-JP" sz="2600" dirty="0" smtClean="0"/>
               <a:t>~</a:t>
             </a:r>
             <a:r>
-              <a:rPr lang="en-US" altLang="ja-JP" sz="2400" dirty="0"/>
+              <a:rPr lang="en-US" altLang="ja-JP" sz="2600" dirty="0"/>
               <a:t>/lecture/run</a:t>
             </a:r>
             <a:r>
-              <a:rPr lang="en-US" altLang="ja-JP" sz="2400" dirty="0" smtClean="0"/>
+              <a:rPr lang="en-US" altLang="ja-JP" sz="2600" dirty="0" smtClean="0"/>
               <a:t>-4.</a:t>
             </a:r>
             <a:r>
-              <a:rPr lang="en-US" altLang="ja-JP" sz="2400" dirty="0"/>
+              <a:rPr lang="en-US" altLang="ja-JP" sz="2600" dirty="0"/>
               <a:t>sh</a:t>
             </a:r>
             <a:r>
-              <a:rPr lang="ja-JP" altLang="en-US" sz="2400" dirty="0"/>
+              <a:rPr lang="ja-JP" altLang="en-US" sz="2600" dirty="0"/>
               <a:t>・・</a:t>
             </a:r>
             <a:r>
-              <a:rPr lang="ja-JP" altLang="en-US" sz="2400" dirty="0" smtClean="0"/>
+              <a:rPr lang="ja-JP" altLang="en-US" sz="2600" dirty="0" smtClean="0"/>
               <a:t>・</a:t>
             </a:r>
             <a:r>
-              <a:rPr lang="en-US" altLang="ja-JP" sz="2400" dirty="0" smtClean="0"/>
+              <a:rPr lang="en-US" altLang="ja-JP" sz="2600" dirty="0" smtClean="0"/>
               <a:t>4</a:t>
             </a:r>
             <a:r>
-              <a:rPr lang="ja-JP" altLang="en-US" sz="2400" dirty="0" smtClean="0"/>
+              <a:rPr lang="ja-JP" altLang="en-US" sz="2600" dirty="0" smtClean="0"/>
               <a:t>プロセス用</a:t>
             </a:r>
-            <a:endParaRPr lang="en-US" altLang="ja-JP" sz="2400" dirty="0" smtClean="0"/>
+            <a:endParaRPr lang="en-US" altLang="ja-JP" sz="2600" dirty="0" smtClean="0"/>
           </a:p>
         </p:txBody>
       </p:sp>
@@ -4175,8 +4114,8 @@
         </p:nvSpPr>
         <p:spPr>
           <a:xfrm>
-            <a:off x="1164166" y="4360334"/>
-            <a:ext cx="3041217" cy="2308324"/>
+            <a:off x="1164166" y="4169833"/>
+            <a:ext cx="3041217" cy="2585323"/>
           </a:xfrm>
           <a:prstGeom prst="rect">
             <a:avLst/>
@@ -4210,8 +4149,19 @@
           <a:p>
             <a:r>
               <a:rPr lang="en-US" altLang="ja-JP" dirty="0"/>
-              <a:t>#SBATCH -p d024h</a:t>
-            </a:r>
+              <a:t>#SBATCH -p </a:t>
+            </a:r>
+            <a:r>
+              <a:rPr lang="en-US" altLang="ja-JP" dirty="0" smtClean="0"/>
+              <a:t>d024h</a:t>
+            </a:r>
+          </a:p>
+          <a:p>
+            <a:r>
+              <a:rPr lang="en-US" altLang="ja-JP" dirty="0" smtClean="0"/>
+              <a:t>#SBATCH –t 0:01:00</a:t>
+            </a:r>
+            <a:endParaRPr lang="en-US" altLang="ja-JP" dirty="0"/>
           </a:p>
           <a:p>
             <a:r>
@@ -4289,7 +4239,7 @@
         </p:nvSpPr>
         <p:spPr>
           <a:xfrm>
-            <a:off x="4205383" y="4267329"/>
+            <a:off x="4205383" y="4177683"/>
             <a:ext cx="1051916" cy="400110"/>
           </a:xfrm>
           <a:prstGeom prst="rect">

</xml_diff>

<commit_message>
Add description of fjdel and fjstat
</commit_message>
<xml_diff>
--- a/misc/FOCUS/FOCUS.pptx
+++ b/misc/FOCUS/FOCUS.pptx
@@ -9,6 +9,7 @@
     <p:sldId id="257" r:id="rId3"/>
     <p:sldId id="259" r:id="rId4"/>
     <p:sldId id="260" r:id="rId5"/>
+    <p:sldId id="261" r:id="rId6"/>
   </p:sldIdLst>
   <p:sldSz cx="9144000" cy="6858000" type="screen4x3"/>
   <p:notesSz cx="6858000" cy="9144000"/>
@@ -304,7 +305,7 @@
           <a:p>
             <a:fld id="{66F2DB81-FDD4-6C4C-99FD-378D10BF8DE1}" type="datetimeFigureOut">
               <a:rPr kumimoji="1" lang="ja-JP" altLang="en-US" smtClean="0"/>
-              <a:t>16/01/08</a:t>
+              <a:t>16/01/11</a:t>
             </a:fld>
             <a:endParaRPr kumimoji="1" lang="ja-JP" altLang="en-US"/>
           </a:p>
@@ -501,7 +502,7 @@
           <a:p>
             <a:fld id="{66F2DB81-FDD4-6C4C-99FD-378D10BF8DE1}" type="datetimeFigureOut">
               <a:rPr kumimoji="1" lang="ja-JP" altLang="en-US" smtClean="0"/>
-              <a:t>16/01/08</a:t>
+              <a:t>16/01/11</a:t>
             </a:fld>
             <a:endParaRPr kumimoji="1" lang="ja-JP" altLang="en-US"/>
           </a:p>
@@ -708,7 +709,7 @@
           <a:p>
             <a:fld id="{66F2DB81-FDD4-6C4C-99FD-378D10BF8DE1}" type="datetimeFigureOut">
               <a:rPr kumimoji="1" lang="ja-JP" altLang="en-US" smtClean="0"/>
-              <a:t>16/01/08</a:t>
+              <a:t>16/01/11</a:t>
             </a:fld>
             <a:endParaRPr kumimoji="1" lang="ja-JP" altLang="en-US"/>
           </a:p>
@@ -905,7 +906,7 @@
           <a:p>
             <a:fld id="{66F2DB81-FDD4-6C4C-99FD-378D10BF8DE1}" type="datetimeFigureOut">
               <a:rPr kumimoji="1" lang="ja-JP" altLang="en-US" smtClean="0"/>
-              <a:t>16/01/08</a:t>
+              <a:t>16/01/11</a:t>
             </a:fld>
             <a:endParaRPr kumimoji="1" lang="ja-JP" altLang="en-US"/>
           </a:p>
@@ -1146,7 +1147,7 @@
           <a:p>
             <a:fld id="{66F2DB81-FDD4-6C4C-99FD-378D10BF8DE1}" type="datetimeFigureOut">
               <a:rPr kumimoji="1" lang="ja-JP" altLang="en-US" smtClean="0"/>
-              <a:t>16/01/08</a:t>
+              <a:t>16/01/11</a:t>
             </a:fld>
             <a:endParaRPr kumimoji="1" lang="ja-JP" altLang="en-US"/>
           </a:p>
@@ -1493,7 +1494,7 @@
           <a:p>
             <a:fld id="{66F2DB81-FDD4-6C4C-99FD-378D10BF8DE1}" type="datetimeFigureOut">
               <a:rPr kumimoji="1" lang="ja-JP" altLang="en-US" smtClean="0"/>
-              <a:t>16/01/08</a:t>
+              <a:t>16/01/11</a:t>
             </a:fld>
             <a:endParaRPr kumimoji="1" lang="ja-JP" altLang="en-US"/>
           </a:p>
@@ -1986,7 +1987,7 @@
           <a:p>
             <a:fld id="{66F2DB81-FDD4-6C4C-99FD-378D10BF8DE1}" type="datetimeFigureOut">
               <a:rPr kumimoji="1" lang="ja-JP" altLang="en-US" smtClean="0"/>
-              <a:t>16/01/08</a:t>
+              <a:t>16/01/11</a:t>
             </a:fld>
             <a:endParaRPr kumimoji="1" lang="ja-JP" altLang="en-US"/>
           </a:p>
@@ -2099,7 +2100,7 @@
           <a:p>
             <a:fld id="{66F2DB81-FDD4-6C4C-99FD-378D10BF8DE1}" type="datetimeFigureOut">
               <a:rPr kumimoji="1" lang="ja-JP" altLang="en-US" smtClean="0"/>
-              <a:t>16/01/08</a:t>
+              <a:t>16/01/11</a:t>
             </a:fld>
             <a:endParaRPr kumimoji="1" lang="ja-JP" altLang="en-US"/>
           </a:p>
@@ -2189,7 +2190,7 @@
           <a:p>
             <a:fld id="{66F2DB81-FDD4-6C4C-99FD-378D10BF8DE1}" type="datetimeFigureOut">
               <a:rPr kumimoji="1" lang="ja-JP" altLang="en-US" smtClean="0"/>
-              <a:t>16/01/08</a:t>
+              <a:t>16/01/11</a:t>
             </a:fld>
             <a:endParaRPr kumimoji="1" lang="ja-JP" altLang="en-US"/>
           </a:p>
@@ -2378,7 +2379,7 @@
           <a:p>
             <a:fld id="{66F2DB81-FDD4-6C4C-99FD-378D10BF8DE1}" type="datetimeFigureOut">
               <a:rPr kumimoji="1" lang="ja-JP" altLang="en-US" smtClean="0"/>
-              <a:t>16/01/08</a:t>
+              <a:t>16/01/11</a:t>
             </a:fld>
             <a:endParaRPr kumimoji="1" lang="ja-JP" altLang="en-US"/>
           </a:p>
@@ -2728,7 +2729,7 @@
           <a:p>
             <a:fld id="{66F2DB81-FDD4-6C4C-99FD-378D10BF8DE1}" type="datetimeFigureOut">
               <a:rPr kumimoji="1" lang="ja-JP" altLang="en-US" smtClean="0"/>
-              <a:t>16/01/08</a:t>
+              <a:t>16/01/11</a:t>
             </a:fld>
             <a:endParaRPr kumimoji="1" lang="ja-JP" altLang="en-US"/>
           </a:p>
@@ -3139,7 +3140,7 @@
           <a:p>
             <a:fld id="{66F2DB81-FDD4-6C4C-99FD-378D10BF8DE1}" type="datetimeFigureOut">
               <a:rPr kumimoji="1" lang="ja-JP" altLang="en-US" smtClean="0"/>
-              <a:t>16/01/08</a:t>
+              <a:t>16/01/11</a:t>
             </a:fld>
             <a:endParaRPr kumimoji="1" lang="ja-JP" altLang="en-US"/>
           </a:p>
@@ -3893,12 +3894,12 @@
               <a:t>xmp</a:t>
             </a:r>
             <a:r>
-              <a:rPr lang="en-US" altLang="ja-JP" sz="2400" dirty="0"/>
-              <a:t>/</a:t>
-            </a:r>
-            <a:r>
               <a:rPr lang="en-US" altLang="ja-JP" sz="2400" dirty="0" smtClean="0"/>
-              <a:t>lecture ~/</a:t>
+              <a:t>/sample </a:t>
+            </a:r>
+            <a:r>
+              <a:rPr lang="en-US" altLang="ja-JP" sz="2400" dirty="0" smtClean="0"/>
+              <a:t>~/</a:t>
             </a:r>
             <a:endParaRPr lang="en-US" altLang="ja-JP" sz="2400" dirty="0"/>
           </a:p>
@@ -4114,7 +4115,7 @@
         </p:nvSpPr>
         <p:spPr>
           <a:xfrm>
-            <a:off x="1164166" y="4169833"/>
+            <a:off x="703384" y="4023739"/>
             <a:ext cx="3041217" cy="2585323"/>
           </a:xfrm>
           <a:prstGeom prst="rect">
@@ -4239,7 +4240,7 @@
         </p:nvSpPr>
         <p:spPr>
           <a:xfrm>
-            <a:off x="4205383" y="4177683"/>
+            <a:off x="3744601" y="3977628"/>
             <a:ext cx="1051916" cy="400110"/>
           </a:xfrm>
           <a:prstGeom prst="rect">
@@ -4265,6 +4266,174 @@
     <p:extLst>
       <p:ext uri="{BB962C8B-B14F-4D97-AF65-F5344CB8AC3E}">
         <p14:creationId xmlns:p14="http://schemas.microsoft.com/office/powerpoint/2010/main" val="3422158696"/>
+      </p:ext>
+    </p:extLst>
+  </p:cSld>
+  <p:clrMapOvr>
+    <a:masterClrMapping/>
+  </p:clrMapOvr>
+</p:sld>
+</file>
+
+<file path=ppt/slides/slide5.xml><?xml version="1.0" encoding="utf-8"?>
+<p:sld xmlns:a="http://schemas.openxmlformats.org/drawingml/2006/main" xmlns:r="http://schemas.openxmlformats.org/officeDocument/2006/relationships" xmlns:p="http://schemas.openxmlformats.org/presentationml/2006/main">
+  <p:cSld>
+    <p:spTree>
+      <p:nvGrpSpPr>
+        <p:cNvPr id="1" name=""/>
+        <p:cNvGrpSpPr/>
+        <p:nvPr/>
+      </p:nvGrpSpPr>
+      <p:grpSpPr>
+        <a:xfrm>
+          <a:off x="0" y="0"/>
+          <a:ext cx="0" cy="0"/>
+          <a:chOff x="0" y="0"/>
+          <a:chExt cx="0" cy="0"/>
+        </a:xfrm>
+      </p:grpSpPr>
+      <p:sp>
+        <p:nvSpPr>
+          <p:cNvPr id="2" name="タイトル 1"/>
+          <p:cNvSpPr>
+            <a:spLocks noGrp="1"/>
+          </p:cNvSpPr>
+          <p:nvPr>
+            <p:ph type="title"/>
+          </p:nvPr>
+        </p:nvSpPr>
+        <p:spPr/>
+        <p:txBody>
+          <a:bodyPr/>
+          <a:lstStyle/>
+          <a:p>
+            <a:r>
+              <a:rPr lang="en-US" altLang="en-US" dirty="0" smtClean="0"/>
+              <a:t>便利</a:t>
+            </a:r>
+            <a:r>
+              <a:rPr kumimoji="1" lang="ja-JP" altLang="en-US" dirty="0" smtClean="0"/>
+              <a:t>なコマンド</a:t>
+            </a:r>
+            <a:endParaRPr kumimoji="1" lang="ja-JP" altLang="en-US" dirty="0"/>
+          </a:p>
+        </p:txBody>
+      </p:sp>
+      <p:sp>
+        <p:nvSpPr>
+          <p:cNvPr id="3" name="コンテンツ プレースホルダー 2"/>
+          <p:cNvSpPr>
+            <a:spLocks noGrp="1"/>
+          </p:cNvSpPr>
+          <p:nvPr>
+            <p:ph idx="1"/>
+          </p:nvPr>
+        </p:nvSpPr>
+        <p:spPr>
+          <a:xfrm>
+            <a:off x="457200" y="1388540"/>
+            <a:ext cx="7766050" cy="2781293"/>
+          </a:xfrm>
+        </p:spPr>
+        <p:txBody>
+          <a:bodyPr>
+            <a:normAutofit lnSpcReduction="10000"/>
+          </a:bodyPr>
+          <a:lstStyle/>
+          <a:p>
+            <a:pPr algn="just"/>
+            <a:r>
+              <a:rPr lang="ja-JP" altLang="en-US" sz="2600" dirty="0" smtClean="0"/>
+              <a:t>キューの状態を見る</a:t>
+            </a:r>
+            <a:endParaRPr lang="en-US" altLang="ja-JP" sz="2600" dirty="0" smtClean="0"/>
+          </a:p>
+          <a:p>
+            <a:pPr lvl="1" algn="just"/>
+            <a:r>
+              <a:rPr lang="en-US" altLang="ja-JP" sz="2400" dirty="0" smtClean="0"/>
+              <a:t>$ </a:t>
+            </a:r>
+            <a:r>
+              <a:rPr lang="en-US" altLang="ja-JP" sz="2400" dirty="0" err="1" smtClean="0"/>
+              <a:t>fjstat</a:t>
+            </a:r>
+            <a:endParaRPr lang="en-US" altLang="ja-JP" sz="2400" dirty="0" smtClean="0"/>
+          </a:p>
+          <a:p>
+            <a:pPr algn="just"/>
+            <a:endParaRPr lang="en-US" altLang="ja-JP" sz="2800" dirty="0"/>
+          </a:p>
+          <a:p>
+            <a:pPr algn="just"/>
+            <a:r>
+              <a:rPr lang="ja-JP" altLang="en-US" sz="2800" dirty="0" smtClean="0"/>
+              <a:t>ジョブをキャンセルする</a:t>
+            </a:r>
+            <a:endParaRPr lang="en-US" altLang="ja-JP" sz="2800" dirty="0" smtClean="0"/>
+          </a:p>
+          <a:p>
+            <a:pPr lvl="1" algn="just"/>
+            <a:r>
+              <a:rPr lang="en-US" altLang="ja-JP" sz="2400" dirty="0"/>
+              <a:t>$</a:t>
+            </a:r>
+            <a:r>
+              <a:rPr lang="en-US" altLang="ja-JP" sz="2400" dirty="0" smtClean="0"/>
+              <a:t> </a:t>
+            </a:r>
+            <a:r>
+              <a:rPr lang="en-US" altLang="ja-JP" sz="2400" dirty="0" err="1" smtClean="0"/>
+              <a:t>fjdel</a:t>
+            </a:r>
+            <a:r>
+              <a:rPr lang="en-US" altLang="ja-JP" sz="2400" dirty="0" smtClean="0"/>
+              <a:t> </a:t>
+            </a:r>
+            <a:r>
+              <a:rPr lang="ja-JP" altLang="en-US" sz="2400" dirty="0" smtClean="0"/>
+              <a:t>（ジョブ</a:t>
+            </a:r>
+            <a:r>
+              <a:rPr lang="en-US" altLang="ja-JP" sz="2400" dirty="0" smtClean="0"/>
+              <a:t>ID</a:t>
+            </a:r>
+            <a:r>
+              <a:rPr lang="ja-JP" altLang="en-US" sz="2400" dirty="0" smtClean="0"/>
+              <a:t>）</a:t>
+            </a:r>
+            <a:endParaRPr lang="en-US" altLang="ja-JP" sz="2400" dirty="0" smtClean="0"/>
+          </a:p>
+          <a:p>
+            <a:pPr lvl="1" algn="just"/>
+            <a:r>
+              <a:rPr lang="ja-JP" altLang="en-US" sz="2400" dirty="0" smtClean="0"/>
+              <a:t>ジョブ</a:t>
+            </a:r>
+            <a:r>
+              <a:rPr lang="en-US" altLang="ja-JP" sz="2400" dirty="0" smtClean="0"/>
+              <a:t>ID</a:t>
+            </a:r>
+            <a:r>
+              <a:rPr lang="ja-JP" altLang="en-US" sz="2400" dirty="0" smtClean="0"/>
+              <a:t>は</a:t>
+            </a:r>
+            <a:r>
+              <a:rPr lang="en-US" altLang="ja-JP" sz="2400" dirty="0" err="1" smtClean="0"/>
+              <a:t>fjstat</a:t>
+            </a:r>
+            <a:r>
+              <a:rPr lang="ja-JP" altLang="en-US" sz="2400" dirty="0" smtClean="0"/>
+              <a:t>コマンドで確認できる</a:t>
+            </a:r>
+            <a:endParaRPr lang="en-US" altLang="ja-JP" sz="2400" dirty="0" smtClean="0"/>
+          </a:p>
+        </p:txBody>
+      </p:sp>
+    </p:spTree>
+    <p:extLst>
+      <p:ext uri="{BB962C8B-B14F-4D97-AF65-F5344CB8AC3E}">
+        <p14:creationId xmlns:p14="http://schemas.microsoft.com/office/powerpoint/2010/main" val="2081971365"/>
       </p:ext>
     </p:extLst>
   </p:cSld>

</xml_diff>